<commit_message>
Some updates to label adapters.
</commit_message>
<xml_diff>
--- a/Pipeline.pptx
+++ b/Pipeline.pptx
@@ -3508,7 +3508,7 @@
         </p:nvSpPr>
         <p:spPr>
           <a:xfrm>
-            <a:off x="7566132" y="5051259"/>
+            <a:off x="7950940" y="5051259"/>
             <a:ext cx="1324303" cy="592784"/>
           </a:xfrm>
           <a:prstGeom prst="rect">
@@ -3591,8 +3591,8 @@
         </p:nvCxnSpPr>
         <p:spPr>
           <a:xfrm rot="16200000" flipH="1">
-            <a:off x="5635783" y="3417301"/>
-            <a:ext cx="1469335" cy="2391364"/>
+            <a:off x="5828187" y="3224897"/>
+            <a:ext cx="1469335" cy="2776172"/>
           </a:xfrm>
           <a:prstGeom prst="bentConnector2">
             <a:avLst/>
@@ -3673,42 +3673,6 @@
           <a:xfrm>
             <a:off x="7328993" y="3581922"/>
             <a:ext cx="176179" cy="586473"/>
-          </a:xfrm>
-          <a:prstGeom prst="bentConnector2">
-            <a:avLst/>
-          </a:prstGeom>
-          <a:ln>
-            <a:tailEnd type="triangle"/>
-          </a:ln>
-        </p:spPr>
-        <p:style>
-          <a:lnRef idx="1">
-            <a:schemeClr val="accent1"/>
-          </a:lnRef>
-          <a:fillRef idx="0">
-            <a:schemeClr val="accent1"/>
-          </a:fillRef>
-          <a:effectRef idx="0">
-            <a:schemeClr val="accent1"/>
-          </a:effectRef>
-          <a:fontRef idx="minor">
-            <a:schemeClr val="tx1"/>
-          </a:fontRef>
-        </p:style>
-      </p:cxnSp>
-      <p:cxnSp>
-        <p:nvCxnSpPr>
-          <p:cNvPr id="47" name="Elbow Connector 46"/>
-          <p:cNvCxnSpPr>
-            <a:stCxn id="42" idx="3"/>
-            <a:endCxn id="31" idx="0"/>
-          </p:cNvCxnSpPr>
-          <p:nvPr/>
-        </p:nvCxnSpPr>
-        <p:spPr>
-          <a:xfrm>
-            <a:off x="8056965" y="4464787"/>
-            <a:ext cx="171319" cy="586472"/>
           </a:xfrm>
           <a:prstGeom prst="bentConnector2">
             <a:avLst/>
@@ -4432,7 +4396,7 @@
         </p:nvSpPr>
         <p:spPr>
           <a:xfrm>
-            <a:off x="9381267" y="5051260"/>
+            <a:off x="9480590" y="5051260"/>
             <a:ext cx="1103586" cy="592783"/>
           </a:xfrm>
           <a:prstGeom prst="roundRect">
@@ -4479,8 +4443,8 @@
         </p:nvCxnSpPr>
         <p:spPr>
           <a:xfrm>
-            <a:off x="8890435" y="5347651"/>
-            <a:ext cx="490832" cy="1"/>
+            <a:off x="9275243" y="5347651"/>
+            <a:ext cx="205347" cy="1"/>
           </a:xfrm>
           <a:prstGeom prst="bentConnector3">
             <a:avLst/>
@@ -4735,6 +4699,42 @@
             <a:ext cx="0" cy="262102"/>
           </a:xfrm>
           <a:prstGeom prst="straightConnector1">
+            <a:avLst/>
+          </a:prstGeom>
+          <a:ln>
+            <a:tailEnd type="triangle"/>
+          </a:ln>
+        </p:spPr>
+        <p:style>
+          <a:lnRef idx="1">
+            <a:schemeClr val="accent1"/>
+          </a:lnRef>
+          <a:fillRef idx="0">
+            <a:schemeClr val="accent1"/>
+          </a:fillRef>
+          <a:effectRef idx="0">
+            <a:schemeClr val="accent1"/>
+          </a:effectRef>
+          <a:fontRef idx="minor">
+            <a:schemeClr val="tx1"/>
+          </a:fontRef>
+        </p:style>
+      </p:cxnSp>
+      <p:cxnSp>
+        <p:nvCxnSpPr>
+          <p:cNvPr id="298" name="Elbow Connector 297"/>
+          <p:cNvCxnSpPr>
+            <a:stCxn id="42" idx="2"/>
+            <a:endCxn id="31" idx="1"/>
+          </p:cNvCxnSpPr>
+          <p:nvPr/>
+        </p:nvCxnSpPr>
+        <p:spPr>
+          <a:xfrm rot="16200000" flipH="1">
+            <a:off x="7434820" y="4831530"/>
+            <a:ext cx="586473" cy="445768"/>
+          </a:xfrm>
+          <a:prstGeom prst="bentConnector2">
             <a:avLst/>
           </a:prstGeom>
           <a:ln>

</xml_diff>

<commit_message>
Small updates to MapsUtilities, fixed a bug with the TypeSystemPriorities, and added a class for confusion matrices.
</commit_message>
<xml_diff>
--- a/Pipeline.pptx
+++ b/Pipeline.pptx
@@ -4,6 +4,9 @@
   <p:sldMasterIdLst>
     <p:sldMasterId id="2147483648" r:id="rId1"/>
   </p:sldMasterIdLst>
+  <p:notesMasterIdLst>
+    <p:notesMasterId r:id="rId3"/>
+  </p:notesMasterIdLst>
   <p:sldIdLst>
     <p:sldId id="256" r:id="rId2"/>
   </p:sldIdLst>
@@ -104,7 +107,446 @@
       </a:defRPr>
     </a:lvl9pPr>
   </p:defaultTextStyle>
+  <p:extLst>
+    <p:ext uri="{EFAFB233-063F-42B5-8137-9DF3F51BA10A}">
+      <p15:sldGuideLst xmlns:p15="http://schemas.microsoft.com/office/powerpoint/2012/main"/>
+    </p:ext>
+  </p:extLst>
 </p:presentation>
+</file>
+
+<file path=ppt/notesMasters/notesMaster1.xml><?xml version="1.0" encoding="utf-8"?>
+<p:notesMaster xmlns:a="http://schemas.openxmlformats.org/drawingml/2006/main" xmlns:r="http://schemas.openxmlformats.org/officeDocument/2006/relationships" xmlns:p="http://schemas.openxmlformats.org/presentationml/2006/main">
+  <p:cSld>
+    <p:bg>
+      <p:bgRef idx="1001">
+        <a:schemeClr val="bg1"/>
+      </p:bgRef>
+    </p:bg>
+    <p:spTree>
+      <p:nvGrpSpPr>
+        <p:cNvPr id="1" name=""/>
+        <p:cNvGrpSpPr/>
+        <p:nvPr/>
+      </p:nvGrpSpPr>
+      <p:grpSpPr>
+        <a:xfrm>
+          <a:off x="0" y="0"/>
+          <a:ext cx="0" cy="0"/>
+          <a:chOff x="0" y="0"/>
+          <a:chExt cx="0" cy="0"/>
+        </a:xfrm>
+      </p:grpSpPr>
+      <p:sp>
+        <p:nvSpPr>
+          <p:cNvPr id="2" name="Header Placeholder 1"/>
+          <p:cNvSpPr>
+            <a:spLocks noGrp="1"/>
+          </p:cNvSpPr>
+          <p:nvPr>
+            <p:ph type="hdr" sz="quarter"/>
+          </p:nvPr>
+        </p:nvSpPr>
+        <p:spPr>
+          <a:xfrm>
+            <a:off x="0" y="0"/>
+            <a:ext cx="2971800" cy="458788"/>
+          </a:xfrm>
+          <a:prstGeom prst="rect">
+            <a:avLst/>
+          </a:prstGeom>
+        </p:spPr>
+        <p:txBody>
+          <a:bodyPr vert="horz" lIns="91440" tIns="45720" rIns="91440" bIns="45720" rtlCol="0"/>
+          <a:lstStyle>
+            <a:lvl1pPr algn="l">
+              <a:defRPr sz="1200"/>
+            </a:lvl1pPr>
+          </a:lstStyle>
+          <a:p>
+            <a:endParaRPr lang="en-US"/>
+          </a:p>
+        </p:txBody>
+      </p:sp>
+      <p:sp>
+        <p:nvSpPr>
+          <p:cNvPr id="3" name="Date Placeholder 2"/>
+          <p:cNvSpPr>
+            <a:spLocks noGrp="1"/>
+          </p:cNvSpPr>
+          <p:nvPr>
+            <p:ph type="dt" idx="1"/>
+          </p:nvPr>
+        </p:nvSpPr>
+        <p:spPr>
+          <a:xfrm>
+            <a:off x="3884613" y="0"/>
+            <a:ext cx="2971800" cy="458788"/>
+          </a:xfrm>
+          <a:prstGeom prst="rect">
+            <a:avLst/>
+          </a:prstGeom>
+        </p:spPr>
+        <p:txBody>
+          <a:bodyPr vert="horz" lIns="91440" tIns="45720" rIns="91440" bIns="45720" rtlCol="0"/>
+          <a:lstStyle>
+            <a:lvl1pPr algn="r">
+              <a:defRPr sz="1200"/>
+            </a:lvl1pPr>
+          </a:lstStyle>
+          <a:p>
+            <a:fld id="{C4E55AE6-79EC-FA44-A8F2-9BA53EC7D968}" type="datetimeFigureOut">
+              <a:rPr lang="en-US" smtClean="0"/>
+              <a:t>8/8/16</a:t>
+            </a:fld>
+            <a:endParaRPr lang="en-US"/>
+          </a:p>
+        </p:txBody>
+      </p:sp>
+      <p:sp>
+        <p:nvSpPr>
+          <p:cNvPr id="4" name="Slide Image Placeholder 3"/>
+          <p:cNvSpPr>
+            <a:spLocks noGrp="1" noRot="1" noChangeAspect="1"/>
+          </p:cNvSpPr>
+          <p:nvPr>
+            <p:ph type="sldImg" idx="2"/>
+          </p:nvPr>
+        </p:nvSpPr>
+        <p:spPr>
+          <a:xfrm>
+            <a:off x="685800" y="1143000"/>
+            <a:ext cx="5486400" cy="3086100"/>
+          </a:xfrm>
+          <a:prstGeom prst="rect">
+            <a:avLst/>
+          </a:prstGeom>
+          <a:noFill/>
+          <a:ln w="12700">
+            <a:solidFill>
+              <a:prstClr val="black"/>
+            </a:solidFill>
+          </a:ln>
+        </p:spPr>
+        <p:txBody>
+          <a:bodyPr vert="horz" lIns="91440" tIns="45720" rIns="91440" bIns="45720" rtlCol="0" anchor="ctr"/>
+          <a:lstStyle/>
+          <a:p>
+            <a:endParaRPr lang="en-US"/>
+          </a:p>
+        </p:txBody>
+      </p:sp>
+      <p:sp>
+        <p:nvSpPr>
+          <p:cNvPr id="5" name="Notes Placeholder 4"/>
+          <p:cNvSpPr>
+            <a:spLocks noGrp="1"/>
+          </p:cNvSpPr>
+          <p:nvPr>
+            <p:ph type="body" sz="quarter" idx="3"/>
+          </p:nvPr>
+        </p:nvSpPr>
+        <p:spPr>
+          <a:xfrm>
+            <a:off x="685800" y="4400550"/>
+            <a:ext cx="5486400" cy="3600450"/>
+          </a:xfrm>
+          <a:prstGeom prst="rect">
+            <a:avLst/>
+          </a:prstGeom>
+        </p:spPr>
+        <p:txBody>
+          <a:bodyPr vert="horz" lIns="91440" tIns="45720" rIns="91440" bIns="45720" rtlCol="0"/>
+          <a:lstStyle/>
+          <a:p>
+            <a:pPr lvl="0"/>
+            <a:r>
+              <a:rPr lang="en-US" smtClean="0"/>
+              <a:t>Click to edit Master text styles</a:t>
+            </a:r>
+          </a:p>
+          <a:p>
+            <a:pPr lvl="1"/>
+            <a:r>
+              <a:rPr lang="en-US" smtClean="0"/>
+              <a:t>Second level</a:t>
+            </a:r>
+          </a:p>
+          <a:p>
+            <a:pPr lvl="2"/>
+            <a:r>
+              <a:rPr lang="en-US" smtClean="0"/>
+              <a:t>Third level</a:t>
+            </a:r>
+          </a:p>
+          <a:p>
+            <a:pPr lvl="3"/>
+            <a:r>
+              <a:rPr lang="en-US" smtClean="0"/>
+              <a:t>Fourth level</a:t>
+            </a:r>
+          </a:p>
+          <a:p>
+            <a:pPr lvl="4"/>
+            <a:r>
+              <a:rPr lang="en-US" smtClean="0"/>
+              <a:t>Fifth level</a:t>
+            </a:r>
+            <a:endParaRPr lang="en-US"/>
+          </a:p>
+        </p:txBody>
+      </p:sp>
+      <p:sp>
+        <p:nvSpPr>
+          <p:cNvPr id="6" name="Footer Placeholder 5"/>
+          <p:cNvSpPr>
+            <a:spLocks noGrp="1"/>
+          </p:cNvSpPr>
+          <p:nvPr>
+            <p:ph type="ftr" sz="quarter" idx="4"/>
+          </p:nvPr>
+        </p:nvSpPr>
+        <p:spPr>
+          <a:xfrm>
+            <a:off x="0" y="8685213"/>
+            <a:ext cx="2971800" cy="458787"/>
+          </a:xfrm>
+          <a:prstGeom prst="rect">
+            <a:avLst/>
+          </a:prstGeom>
+        </p:spPr>
+        <p:txBody>
+          <a:bodyPr vert="horz" lIns="91440" tIns="45720" rIns="91440" bIns="45720" rtlCol="0" anchor="b"/>
+          <a:lstStyle>
+            <a:lvl1pPr algn="l">
+              <a:defRPr sz="1200"/>
+            </a:lvl1pPr>
+          </a:lstStyle>
+          <a:p>
+            <a:endParaRPr lang="en-US"/>
+          </a:p>
+        </p:txBody>
+      </p:sp>
+      <p:sp>
+        <p:nvSpPr>
+          <p:cNvPr id="7" name="Slide Number Placeholder 6"/>
+          <p:cNvSpPr>
+            <a:spLocks noGrp="1"/>
+          </p:cNvSpPr>
+          <p:nvPr>
+            <p:ph type="sldNum" sz="quarter" idx="5"/>
+          </p:nvPr>
+        </p:nvSpPr>
+        <p:spPr>
+          <a:xfrm>
+            <a:off x="3884613" y="8685213"/>
+            <a:ext cx="2971800" cy="458787"/>
+          </a:xfrm>
+          <a:prstGeom prst="rect">
+            <a:avLst/>
+          </a:prstGeom>
+        </p:spPr>
+        <p:txBody>
+          <a:bodyPr vert="horz" lIns="91440" tIns="45720" rIns="91440" bIns="45720" rtlCol="0" anchor="b"/>
+          <a:lstStyle>
+            <a:lvl1pPr algn="r">
+              <a:defRPr sz="1200"/>
+            </a:lvl1pPr>
+          </a:lstStyle>
+          <a:p>
+            <a:fld id="{1D7889BB-194F-AE4B-A884-ACD0E73BAC88}" type="slidenum">
+              <a:rPr lang="en-US" smtClean="0"/>
+              <a:t>‹#›</a:t>
+            </a:fld>
+            <a:endParaRPr lang="en-US"/>
+          </a:p>
+        </p:txBody>
+      </p:sp>
+    </p:spTree>
+    <p:extLst>
+      <p:ext uri="{BB962C8B-B14F-4D97-AF65-F5344CB8AC3E}">
+        <p14:creationId xmlns:p14="http://schemas.microsoft.com/office/powerpoint/2010/main" val="728247869"/>
+      </p:ext>
+    </p:extLst>
+  </p:cSld>
+  <p:clrMap bg1="lt1" tx1="dk1" bg2="lt2" tx2="dk2" accent1="accent1" accent2="accent2" accent3="accent3" accent4="accent4" accent5="accent5" accent6="accent6" hlink="hlink" folHlink="folHlink"/>
+  <p:notesStyle>
+    <a:lvl1pPr marL="0" algn="l" defTabSz="914400" rtl="0" eaLnBrk="1" latinLnBrk="0" hangingPunct="1">
+      <a:defRPr sz="1200" kern="1200">
+        <a:solidFill>
+          <a:schemeClr val="tx1"/>
+        </a:solidFill>
+        <a:latin typeface="+mn-lt"/>
+        <a:ea typeface="+mn-ea"/>
+        <a:cs typeface="+mn-cs"/>
+      </a:defRPr>
+    </a:lvl1pPr>
+    <a:lvl2pPr marL="457200" algn="l" defTabSz="914400" rtl="0" eaLnBrk="1" latinLnBrk="0" hangingPunct="1">
+      <a:defRPr sz="1200" kern="1200">
+        <a:solidFill>
+          <a:schemeClr val="tx1"/>
+        </a:solidFill>
+        <a:latin typeface="+mn-lt"/>
+        <a:ea typeface="+mn-ea"/>
+        <a:cs typeface="+mn-cs"/>
+      </a:defRPr>
+    </a:lvl2pPr>
+    <a:lvl3pPr marL="914400" algn="l" defTabSz="914400" rtl="0" eaLnBrk="1" latinLnBrk="0" hangingPunct="1">
+      <a:defRPr sz="1200" kern="1200">
+        <a:solidFill>
+          <a:schemeClr val="tx1"/>
+        </a:solidFill>
+        <a:latin typeface="+mn-lt"/>
+        <a:ea typeface="+mn-ea"/>
+        <a:cs typeface="+mn-cs"/>
+      </a:defRPr>
+    </a:lvl3pPr>
+    <a:lvl4pPr marL="1371600" algn="l" defTabSz="914400" rtl="0" eaLnBrk="1" latinLnBrk="0" hangingPunct="1">
+      <a:defRPr sz="1200" kern="1200">
+        <a:solidFill>
+          <a:schemeClr val="tx1"/>
+        </a:solidFill>
+        <a:latin typeface="+mn-lt"/>
+        <a:ea typeface="+mn-ea"/>
+        <a:cs typeface="+mn-cs"/>
+      </a:defRPr>
+    </a:lvl4pPr>
+    <a:lvl5pPr marL="1828800" algn="l" defTabSz="914400" rtl="0" eaLnBrk="1" latinLnBrk="0" hangingPunct="1">
+      <a:defRPr sz="1200" kern="1200">
+        <a:solidFill>
+          <a:schemeClr val="tx1"/>
+        </a:solidFill>
+        <a:latin typeface="+mn-lt"/>
+        <a:ea typeface="+mn-ea"/>
+        <a:cs typeface="+mn-cs"/>
+      </a:defRPr>
+    </a:lvl5pPr>
+    <a:lvl6pPr marL="2286000" algn="l" defTabSz="914400" rtl="0" eaLnBrk="1" latinLnBrk="0" hangingPunct="1">
+      <a:defRPr sz="1200" kern="1200">
+        <a:solidFill>
+          <a:schemeClr val="tx1"/>
+        </a:solidFill>
+        <a:latin typeface="+mn-lt"/>
+        <a:ea typeface="+mn-ea"/>
+        <a:cs typeface="+mn-cs"/>
+      </a:defRPr>
+    </a:lvl6pPr>
+    <a:lvl7pPr marL="2743200" algn="l" defTabSz="914400" rtl="0" eaLnBrk="1" latinLnBrk="0" hangingPunct="1">
+      <a:defRPr sz="1200" kern="1200">
+        <a:solidFill>
+          <a:schemeClr val="tx1"/>
+        </a:solidFill>
+        <a:latin typeface="+mn-lt"/>
+        <a:ea typeface="+mn-ea"/>
+        <a:cs typeface="+mn-cs"/>
+      </a:defRPr>
+    </a:lvl7pPr>
+    <a:lvl8pPr marL="3200400" algn="l" defTabSz="914400" rtl="0" eaLnBrk="1" latinLnBrk="0" hangingPunct="1">
+      <a:defRPr sz="1200" kern="1200">
+        <a:solidFill>
+          <a:schemeClr val="tx1"/>
+        </a:solidFill>
+        <a:latin typeface="+mn-lt"/>
+        <a:ea typeface="+mn-ea"/>
+        <a:cs typeface="+mn-cs"/>
+      </a:defRPr>
+    </a:lvl8pPr>
+    <a:lvl9pPr marL="3657600" algn="l" defTabSz="914400" rtl="0" eaLnBrk="1" latinLnBrk="0" hangingPunct="1">
+      <a:defRPr sz="1200" kern="1200">
+        <a:solidFill>
+          <a:schemeClr val="tx1"/>
+        </a:solidFill>
+        <a:latin typeface="+mn-lt"/>
+        <a:ea typeface="+mn-ea"/>
+        <a:cs typeface="+mn-cs"/>
+      </a:defRPr>
+    </a:lvl9pPr>
+  </p:notesStyle>
+</p:notesMaster>
+</file>
+
+<file path=ppt/notesSlides/notesSlide1.xml><?xml version="1.0" encoding="utf-8"?>
+<p:notes xmlns:a="http://schemas.openxmlformats.org/drawingml/2006/main" xmlns:r="http://schemas.openxmlformats.org/officeDocument/2006/relationships" xmlns:p="http://schemas.openxmlformats.org/presentationml/2006/main">
+  <p:cSld>
+    <p:spTree>
+      <p:nvGrpSpPr>
+        <p:cNvPr id="1" name=""/>
+        <p:cNvGrpSpPr/>
+        <p:nvPr/>
+      </p:nvGrpSpPr>
+      <p:grpSpPr>
+        <a:xfrm>
+          <a:off x="0" y="0"/>
+          <a:ext cx="0" cy="0"/>
+          <a:chOff x="0" y="0"/>
+          <a:chExt cx="0" cy="0"/>
+        </a:xfrm>
+      </p:grpSpPr>
+      <p:sp>
+        <p:nvSpPr>
+          <p:cNvPr id="2" name="Slide Image Placeholder 1"/>
+          <p:cNvSpPr>
+            <a:spLocks noGrp="1" noRot="1" noChangeAspect="1"/>
+          </p:cNvSpPr>
+          <p:nvPr>
+            <p:ph type="sldImg"/>
+          </p:nvPr>
+        </p:nvSpPr>
+        <p:spPr/>
+      </p:sp>
+      <p:sp>
+        <p:nvSpPr>
+          <p:cNvPr id="3" name="Notes Placeholder 2"/>
+          <p:cNvSpPr>
+            <a:spLocks noGrp="1"/>
+          </p:cNvSpPr>
+          <p:nvPr>
+            <p:ph type="body" idx="1"/>
+          </p:nvPr>
+        </p:nvSpPr>
+        <p:spPr/>
+        <p:txBody>
+          <a:bodyPr/>
+          <a:lstStyle/>
+          <a:p>
+            <a:endParaRPr lang="en-US" dirty="0"/>
+          </a:p>
+        </p:txBody>
+      </p:sp>
+      <p:sp>
+        <p:nvSpPr>
+          <p:cNvPr id="4" name="Slide Number Placeholder 3"/>
+          <p:cNvSpPr>
+            <a:spLocks noGrp="1"/>
+          </p:cNvSpPr>
+          <p:nvPr>
+            <p:ph type="sldNum" sz="quarter" idx="10"/>
+          </p:nvPr>
+        </p:nvSpPr>
+        <p:spPr/>
+        <p:txBody>
+          <a:bodyPr/>
+          <a:lstStyle/>
+          <a:p>
+            <a:fld id="{1D7889BB-194F-AE4B-A884-ACD0E73BAC88}" type="slidenum">
+              <a:rPr lang="en-US" smtClean="0"/>
+              <a:t>1</a:t>
+            </a:fld>
+            <a:endParaRPr lang="en-US"/>
+          </a:p>
+        </p:txBody>
+      </p:sp>
+    </p:spTree>
+    <p:extLst>
+      <p:ext uri="{BB962C8B-B14F-4D97-AF65-F5344CB8AC3E}">
+        <p14:creationId xmlns:p14="http://schemas.microsoft.com/office/powerpoint/2010/main" val="1152630030"/>
+      </p:ext>
+    </p:extLst>
+  </p:cSld>
+  <p:clrMapOvr>
+    <a:masterClrMapping/>
+  </p:clrMapOvr>
+</p:notes>
 </file>
 
 <file path=ppt/slideLayouts/slideLayout1.xml><?xml version="1.0" encoding="utf-8"?>
@@ -238,7 +680,7 @@
           <a:p>
             <a:fld id="{365EC724-C63E-0543-ACA4-A17C046F996D}" type="datetimeFigureOut">
               <a:rPr lang="en-US" smtClean="0"/>
-              <a:t>7/21/16</a:t>
+              <a:t>7/27/16</a:t>
             </a:fld>
             <a:endParaRPr lang="en-US"/>
           </a:p>
@@ -408,7 +850,7 @@
           <a:p>
             <a:fld id="{365EC724-C63E-0543-ACA4-A17C046F996D}" type="datetimeFigureOut">
               <a:rPr lang="en-US" smtClean="0"/>
-              <a:t>7/21/16</a:t>
+              <a:t>7/27/16</a:t>
             </a:fld>
             <a:endParaRPr lang="en-US"/>
           </a:p>
@@ -588,7 +1030,7 @@
           <a:p>
             <a:fld id="{365EC724-C63E-0543-ACA4-A17C046F996D}" type="datetimeFigureOut">
               <a:rPr lang="en-US" smtClean="0"/>
-              <a:t>7/21/16</a:t>
+              <a:t>7/27/16</a:t>
             </a:fld>
             <a:endParaRPr lang="en-US"/>
           </a:p>
@@ -758,7 +1200,7 @@
           <a:p>
             <a:fld id="{365EC724-C63E-0543-ACA4-A17C046F996D}" type="datetimeFigureOut">
               <a:rPr lang="en-US" smtClean="0"/>
-              <a:t>7/21/16</a:t>
+              <a:t>7/27/16</a:t>
             </a:fld>
             <a:endParaRPr lang="en-US"/>
           </a:p>
@@ -1004,7 +1446,7 @@
           <a:p>
             <a:fld id="{365EC724-C63E-0543-ACA4-A17C046F996D}" type="datetimeFigureOut">
               <a:rPr lang="en-US" smtClean="0"/>
-              <a:t>7/21/16</a:t>
+              <a:t>7/27/16</a:t>
             </a:fld>
             <a:endParaRPr lang="en-US"/>
           </a:p>
@@ -1236,7 +1678,7 @@
           <a:p>
             <a:fld id="{365EC724-C63E-0543-ACA4-A17C046F996D}" type="datetimeFigureOut">
               <a:rPr lang="en-US" smtClean="0"/>
-              <a:t>7/21/16</a:t>
+              <a:t>7/27/16</a:t>
             </a:fld>
             <a:endParaRPr lang="en-US"/>
           </a:p>
@@ -1603,7 +2045,7 @@
           <a:p>
             <a:fld id="{365EC724-C63E-0543-ACA4-A17C046F996D}" type="datetimeFigureOut">
               <a:rPr lang="en-US" smtClean="0"/>
-              <a:t>7/21/16</a:t>
+              <a:t>7/27/16</a:t>
             </a:fld>
             <a:endParaRPr lang="en-US"/>
           </a:p>
@@ -1721,7 +2163,7 @@
           <a:p>
             <a:fld id="{365EC724-C63E-0543-ACA4-A17C046F996D}" type="datetimeFigureOut">
               <a:rPr lang="en-US" smtClean="0"/>
-              <a:t>7/21/16</a:t>
+              <a:t>7/27/16</a:t>
             </a:fld>
             <a:endParaRPr lang="en-US"/>
           </a:p>
@@ -1816,7 +2258,7 @@
           <a:p>
             <a:fld id="{365EC724-C63E-0543-ACA4-A17C046F996D}" type="datetimeFigureOut">
               <a:rPr lang="en-US" smtClean="0"/>
-              <a:t>7/21/16</a:t>
+              <a:t>7/27/16</a:t>
             </a:fld>
             <a:endParaRPr lang="en-US"/>
           </a:p>
@@ -2093,7 +2535,7 @@
           <a:p>
             <a:fld id="{365EC724-C63E-0543-ACA4-A17C046F996D}" type="datetimeFigureOut">
               <a:rPr lang="en-US" smtClean="0"/>
-              <a:t>7/21/16</a:t>
+              <a:t>7/27/16</a:t>
             </a:fld>
             <a:endParaRPr lang="en-US"/>
           </a:p>
@@ -2346,7 +2788,7 @@
           <a:p>
             <a:fld id="{365EC724-C63E-0543-ACA4-A17C046F996D}" type="datetimeFigureOut">
               <a:rPr lang="en-US" smtClean="0"/>
-              <a:t>7/21/16</a:t>
+              <a:t>7/27/16</a:t>
             </a:fld>
             <a:endParaRPr lang="en-US"/>
           </a:p>
@@ -2559,7 +3001,7 @@
           <a:p>
             <a:fld id="{365EC724-C63E-0543-ACA4-A17C046F996D}" type="datetimeFigureOut">
               <a:rPr lang="en-US" smtClean="0"/>
-              <a:t>7/21/16</a:t>
+              <a:t>7/27/16</a:t>
             </a:fld>
             <a:endParaRPr lang="en-US"/>
           </a:p>
@@ -3175,7 +3617,7 @@
         </p:nvSpPr>
         <p:spPr>
           <a:xfrm>
-            <a:off x="5629076" y="1910781"/>
+            <a:off x="6852547" y="1901321"/>
             <a:ext cx="1324303" cy="592784"/>
           </a:xfrm>
           <a:prstGeom prst="rect">
@@ -3423,39 +3865,6 @@
           </a:p>
         </p:txBody>
       </p:sp>
-      <p:cxnSp>
-        <p:nvCxnSpPr>
-          <p:cNvPr id="26" name="Elbow Connector 25"/>
-          <p:cNvCxnSpPr/>
-          <p:nvPr/>
-        </p:nvCxnSpPr>
-        <p:spPr>
-          <a:xfrm rot="5400000" flipH="1" flipV="1">
-            <a:off x="4934868" y="2594478"/>
-            <a:ext cx="1078361" cy="310055"/>
-          </a:xfrm>
-          <a:prstGeom prst="bentConnector2">
-            <a:avLst/>
-          </a:prstGeom>
-          <a:ln>
-            <a:tailEnd type="triangle"/>
-          </a:ln>
-        </p:spPr>
-        <p:style>
-          <a:lnRef idx="1">
-            <a:schemeClr val="accent1"/>
-          </a:lnRef>
-          <a:fillRef idx="0">
-            <a:schemeClr val="accent1"/>
-          </a:fillRef>
-          <a:effectRef idx="0">
-            <a:schemeClr val="accent1"/>
-          </a:effectRef>
-          <a:fontRef idx="minor">
-            <a:schemeClr val="tx1"/>
-          </a:fontRef>
-        </p:style>
-      </p:cxnSp>
       <p:sp>
         <p:nvSpPr>
           <p:cNvPr id="30" name="Rectangle 29"/>
@@ -3464,7 +3873,7 @@
         </p:nvSpPr>
         <p:spPr>
           <a:xfrm>
-            <a:off x="6004690" y="3285530"/>
+            <a:off x="6004469" y="3852275"/>
             <a:ext cx="1324303" cy="592784"/>
           </a:xfrm>
           <a:prstGeom prst="rect">
@@ -3500,15 +3909,263 @@
           </a:p>
         </p:txBody>
       </p:sp>
-      <p:sp>
-        <p:nvSpPr>
-          <p:cNvPr id="31" name="Rectangle 30"/>
+      <p:cxnSp>
+        <p:nvCxnSpPr>
+          <p:cNvPr id="33" name="Elbow Connector 32"/>
+          <p:cNvCxnSpPr>
+            <a:stCxn id="15" idx="3"/>
+            <a:endCxn id="30" idx="1"/>
+          </p:cNvCxnSpPr>
+          <p:nvPr/>
+        </p:nvCxnSpPr>
+        <p:spPr>
+          <a:xfrm>
+            <a:off x="5726561" y="3581925"/>
+            <a:ext cx="277908" cy="566742"/>
+          </a:xfrm>
+          <a:prstGeom prst="bentConnector3">
+            <a:avLst/>
+          </a:prstGeom>
+          <a:ln>
+            <a:tailEnd type="triangle"/>
+          </a:ln>
+        </p:spPr>
+        <p:style>
+          <a:lnRef idx="1">
+            <a:schemeClr val="accent1"/>
+          </a:lnRef>
+          <a:fillRef idx="0">
+            <a:schemeClr val="accent1"/>
+          </a:fillRef>
+          <a:effectRef idx="0">
+            <a:schemeClr val="accent1"/>
+          </a:effectRef>
+          <a:fontRef idx="minor">
+            <a:schemeClr val="tx1"/>
+          </a:fontRef>
+        </p:style>
+      </p:cxnSp>
+      <p:sp>
+        <p:nvSpPr>
+          <p:cNvPr id="42" name="Rounded Rectangle 41"/>
           <p:cNvSpPr/>
           <p:nvPr/>
         </p:nvSpPr>
         <p:spPr>
           <a:xfrm>
-            <a:off x="7950940" y="5051259"/>
+            <a:off x="7631989" y="3852275"/>
+            <a:ext cx="1103586" cy="592783"/>
+          </a:xfrm>
+          <a:prstGeom prst="roundRect">
+            <a:avLst/>
+          </a:prstGeom>
+        </p:spPr>
+        <p:style>
+          <a:lnRef idx="2">
+            <a:schemeClr val="accent1">
+              <a:shade val="50000"/>
+            </a:schemeClr>
+          </a:lnRef>
+          <a:fillRef idx="1">
+            <a:schemeClr val="accent1"/>
+          </a:fillRef>
+          <a:effectRef idx="0">
+            <a:schemeClr val="accent1"/>
+          </a:effectRef>
+          <a:fontRef idx="minor">
+            <a:schemeClr val="lt1"/>
+          </a:fontRef>
+        </p:style>
+        <p:txBody>
+          <a:bodyPr rtlCol="0" anchor="ctr"/>
+          <a:lstStyle/>
+          <a:p>
+            <a:pPr algn="ctr"/>
+            <a:r>
+              <a:rPr lang="en-US" sz="1400" dirty="0" smtClean="0"/>
+              <a:t>Part of Speech</a:t>
+            </a:r>
+            <a:endParaRPr lang="en-US" sz="1400" dirty="0"/>
+          </a:p>
+        </p:txBody>
+      </p:sp>
+      <p:sp>
+        <p:nvSpPr>
+          <p:cNvPr id="48" name="Rounded Rectangle 47"/>
+          <p:cNvSpPr/>
+          <p:nvPr/>
+        </p:nvSpPr>
+        <p:spPr>
+          <a:xfrm>
+            <a:off x="8423973" y="1901320"/>
+            <a:ext cx="1103586" cy="592783"/>
+          </a:xfrm>
+          <a:prstGeom prst="roundRect">
+            <a:avLst/>
+          </a:prstGeom>
+        </p:spPr>
+        <p:style>
+          <a:lnRef idx="2">
+            <a:schemeClr val="accent1">
+              <a:shade val="50000"/>
+            </a:schemeClr>
+          </a:lnRef>
+          <a:fillRef idx="1">
+            <a:schemeClr val="accent1"/>
+          </a:fillRef>
+          <a:effectRef idx="0">
+            <a:schemeClr val="accent1"/>
+          </a:effectRef>
+          <a:fontRef idx="minor">
+            <a:schemeClr val="lt1"/>
+          </a:fontRef>
+        </p:style>
+        <p:txBody>
+          <a:bodyPr rtlCol="0" anchor="ctr"/>
+          <a:lstStyle/>
+          <a:p>
+            <a:pPr algn="ctr"/>
+            <a:r>
+              <a:rPr lang="en-US" sz="1400" dirty="0" smtClean="0"/>
+              <a:t>Term Token</a:t>
+            </a:r>
+            <a:endParaRPr lang="en-US" sz="1400" dirty="0"/>
+          </a:p>
+        </p:txBody>
+      </p:sp>
+      <p:cxnSp>
+        <p:nvCxnSpPr>
+          <p:cNvPr id="50" name="Elbow Connector 49"/>
+          <p:cNvCxnSpPr>
+            <a:stCxn id="13" idx="3"/>
+            <a:endCxn id="48" idx="1"/>
+          </p:cNvCxnSpPr>
+          <p:nvPr/>
+        </p:nvCxnSpPr>
+        <p:spPr>
+          <a:xfrm flipV="1">
+            <a:off x="8176850" y="2197712"/>
+            <a:ext cx="247123" cy="1"/>
+          </a:xfrm>
+          <a:prstGeom prst="bentConnector3">
+            <a:avLst/>
+          </a:prstGeom>
+          <a:ln>
+            <a:tailEnd type="triangle"/>
+          </a:ln>
+        </p:spPr>
+        <p:style>
+          <a:lnRef idx="1">
+            <a:schemeClr val="accent1"/>
+          </a:lnRef>
+          <a:fillRef idx="0">
+            <a:schemeClr val="accent1"/>
+          </a:fillRef>
+          <a:effectRef idx="0">
+            <a:schemeClr val="accent1"/>
+          </a:effectRef>
+          <a:fontRef idx="minor">
+            <a:schemeClr val="tx1"/>
+          </a:fontRef>
+        </p:style>
+      </p:cxnSp>
+      <p:sp>
+        <p:nvSpPr>
+          <p:cNvPr id="52" name="Rectangle 51"/>
+          <p:cNvSpPr/>
+          <p:nvPr/>
+        </p:nvSpPr>
+        <p:spPr>
+          <a:xfrm>
+            <a:off x="6996012" y="2582391"/>
+            <a:ext cx="1037372" cy="132430"/>
+          </a:xfrm>
+          <a:prstGeom prst="rect">
+            <a:avLst/>
+          </a:prstGeom>
+        </p:spPr>
+        <p:style>
+          <a:lnRef idx="2">
+            <a:schemeClr val="accent6">
+              <a:shade val="50000"/>
+            </a:schemeClr>
+          </a:lnRef>
+          <a:fillRef idx="1">
+            <a:schemeClr val="accent6"/>
+          </a:fillRef>
+          <a:effectRef idx="0">
+            <a:schemeClr val="accent6"/>
+          </a:effectRef>
+          <a:fontRef idx="minor">
+            <a:schemeClr val="lt1"/>
+          </a:fontRef>
+        </p:style>
+        <p:txBody>
+          <a:bodyPr rtlCol="0" anchor="ctr"/>
+          <a:lstStyle/>
+          <a:p>
+            <a:pPr algn="ctr"/>
+            <a:r>
+              <a:rPr lang="en-US" sz="800" smtClean="0"/>
+              <a:t>Rule based merging</a:t>
+            </a:r>
+            <a:endParaRPr lang="en-US" sz="800" dirty="0"/>
+          </a:p>
+        </p:txBody>
+      </p:sp>
+      <p:sp>
+        <p:nvSpPr>
+          <p:cNvPr id="53" name="Rectangle 52"/>
+          <p:cNvSpPr/>
+          <p:nvPr/>
+        </p:nvSpPr>
+        <p:spPr>
+          <a:xfrm>
+            <a:off x="2159876" y="2585545"/>
+            <a:ext cx="881026" cy="132430"/>
+          </a:xfrm>
+          <a:prstGeom prst="rect">
+            <a:avLst/>
+          </a:prstGeom>
+        </p:spPr>
+        <p:style>
+          <a:lnRef idx="2">
+            <a:schemeClr val="accent6">
+              <a:shade val="50000"/>
+            </a:schemeClr>
+          </a:lnRef>
+          <a:fillRef idx="1">
+            <a:schemeClr val="accent6"/>
+          </a:fillRef>
+          <a:effectRef idx="0">
+            <a:schemeClr val="accent6"/>
+          </a:effectRef>
+          <a:fontRef idx="minor">
+            <a:schemeClr val="lt1"/>
+          </a:fontRef>
+        </p:style>
+        <p:txBody>
+          <a:bodyPr rtlCol="0" anchor="ctr"/>
+          <a:lstStyle/>
+          <a:p>
+            <a:pPr algn="ctr"/>
+            <a:r>
+              <a:rPr lang="en-US" sz="800" smtClean="0"/>
+              <a:t>Regex splitting</a:t>
+            </a:r>
+            <a:endParaRPr lang="en-US" sz="800" dirty="0"/>
+          </a:p>
+        </p:txBody>
+      </p:sp>
+      <p:sp>
+        <p:nvSpPr>
+          <p:cNvPr id="59" name="Rectangle 58"/>
+          <p:cNvSpPr/>
+          <p:nvPr/>
+        </p:nvSpPr>
+        <p:spPr>
+          <a:xfrm>
+            <a:off x="126125" y="1910781"/>
             <a:ext cx="1324303" cy="592784"/>
           </a:xfrm>
           <a:prstGeom prst="rect">
@@ -3537,94 +4194,22 @@
           <a:p>
             <a:pPr algn="ctr"/>
             <a:r>
-              <a:rPr lang="en-US" dirty="0" smtClean="0"/>
-              <a:t>Normalizer</a:t>
-            </a:r>
-            <a:endParaRPr lang="en-US" dirty="0"/>
-          </a:p>
-        </p:txBody>
-      </p:sp>
-      <p:cxnSp>
-        <p:nvCxnSpPr>
-          <p:cNvPr id="33" name="Elbow Connector 32"/>
-          <p:cNvCxnSpPr>
-            <a:stCxn id="15" idx="3"/>
-            <a:endCxn id="30" idx="1"/>
-          </p:cNvCxnSpPr>
-          <p:nvPr/>
-        </p:nvCxnSpPr>
-        <p:spPr>
-          <a:xfrm flipV="1">
-            <a:off x="5726561" y="3581922"/>
-            <a:ext cx="278129" cy="3"/>
-          </a:xfrm>
-          <a:prstGeom prst="bentConnector3">
-            <a:avLst/>
-          </a:prstGeom>
-          <a:ln>
-            <a:tailEnd type="triangle"/>
-          </a:ln>
-        </p:spPr>
-        <p:style>
-          <a:lnRef idx="1">
-            <a:schemeClr val="accent1"/>
-          </a:lnRef>
-          <a:fillRef idx="0">
-            <a:schemeClr val="accent1"/>
-          </a:fillRef>
-          <a:effectRef idx="0">
-            <a:schemeClr val="accent1"/>
-          </a:effectRef>
-          <a:fontRef idx="minor">
-            <a:schemeClr val="tx1"/>
-          </a:fontRef>
-        </p:style>
-      </p:cxnSp>
-      <p:cxnSp>
-        <p:nvCxnSpPr>
-          <p:cNvPr id="40" name="Elbow Connector 39"/>
-          <p:cNvCxnSpPr>
-            <a:stCxn id="15" idx="2"/>
-            <a:endCxn id="31" idx="1"/>
-          </p:cNvCxnSpPr>
-          <p:nvPr/>
-        </p:nvCxnSpPr>
-        <p:spPr>
-          <a:xfrm rot="16200000" flipH="1">
-            <a:off x="5828187" y="3224897"/>
-            <a:ext cx="1469335" cy="2776172"/>
-          </a:xfrm>
-          <a:prstGeom prst="bentConnector2">
-            <a:avLst/>
-          </a:prstGeom>
-          <a:ln>
-            <a:tailEnd type="triangle"/>
-          </a:ln>
-        </p:spPr>
-        <p:style>
-          <a:lnRef idx="1">
-            <a:schemeClr val="accent1"/>
-          </a:lnRef>
-          <a:fillRef idx="0">
-            <a:schemeClr val="accent1"/>
-          </a:fillRef>
-          <a:effectRef idx="0">
-            <a:schemeClr val="accent1"/>
-          </a:effectRef>
-          <a:fontRef idx="minor">
-            <a:schemeClr val="tx1"/>
-          </a:fontRef>
-        </p:style>
-      </p:cxnSp>
-      <p:sp>
-        <p:nvSpPr>
-          <p:cNvPr id="42" name="Rounded Rectangle 41"/>
+              <a:rPr lang="en-US" sz="1600" dirty="0" smtClean="0"/>
+              <a:t>Sentence Detector</a:t>
+            </a:r>
+            <a:endParaRPr lang="en-US" sz="1600" dirty="0"/>
+          </a:p>
+        </p:txBody>
+      </p:sp>
+      <p:sp>
+        <p:nvSpPr>
+          <p:cNvPr id="60" name="Rounded Rectangle 59"/>
           <p:cNvSpPr/>
           <p:nvPr/>
         </p:nvSpPr>
         <p:spPr>
           <a:xfrm>
-            <a:off x="6953379" y="4168395"/>
+            <a:off x="1097280" y="3285534"/>
             <a:ext cx="1103586" cy="592783"/>
           </a:xfrm>
           <a:prstGeom prst="roundRect">
@@ -3654,7 +4239,7 @@
             <a:pPr algn="ctr"/>
             <a:r>
               <a:rPr lang="en-US" sz="1400" dirty="0" smtClean="0"/>
-              <a:t>Part of Speech</a:t>
+              <a:t>Sentence</a:t>
             </a:r>
             <a:endParaRPr lang="en-US" sz="1400" dirty="0"/>
           </a:p>
@@ -3662,17 +4247,16 @@
       </p:sp>
       <p:cxnSp>
         <p:nvCxnSpPr>
-          <p:cNvPr id="45" name="Elbow Connector 44"/>
+          <p:cNvPr id="61" name="Elbow Connector 60"/>
           <p:cNvCxnSpPr>
-            <a:stCxn id="30" idx="3"/>
-            <a:endCxn id="42" idx="0"/>
+            <a:stCxn id="61" idx="3"/>
           </p:cNvCxnSpPr>
           <p:nvPr/>
         </p:nvCxnSpPr>
         <p:spPr>
           <a:xfrm>
-            <a:off x="7328993" y="3581922"/>
-            <a:ext cx="176179" cy="586473"/>
+            <a:off x="1450428" y="2207173"/>
+            <a:ext cx="198645" cy="1078361"/>
           </a:xfrm>
           <a:prstGeom prst="bentConnector2">
             <a:avLst/>
@@ -3698,94 +4282,14 @@
       </p:cxnSp>
       <p:sp>
         <p:nvSpPr>
-          <p:cNvPr id="48" name="Rounded Rectangle 47"/>
+          <p:cNvPr id="63" name="Rectangle 62"/>
           <p:cNvSpPr/>
           <p:nvPr/>
         </p:nvSpPr>
         <p:spPr>
           <a:xfrm>
-            <a:off x="7200502" y="1910780"/>
-            <a:ext cx="1103586" cy="592783"/>
-          </a:xfrm>
-          <a:prstGeom prst="roundRect">
-            <a:avLst/>
-          </a:prstGeom>
-        </p:spPr>
-        <p:style>
-          <a:lnRef idx="2">
-            <a:schemeClr val="accent1">
-              <a:shade val="50000"/>
-            </a:schemeClr>
-          </a:lnRef>
-          <a:fillRef idx="1">
-            <a:schemeClr val="accent1"/>
-          </a:fillRef>
-          <a:effectRef idx="0">
-            <a:schemeClr val="accent1"/>
-          </a:effectRef>
-          <a:fontRef idx="minor">
-            <a:schemeClr val="lt1"/>
-          </a:fontRef>
-        </p:style>
-        <p:txBody>
-          <a:bodyPr rtlCol="0" anchor="ctr"/>
-          <a:lstStyle/>
-          <a:p>
-            <a:pPr algn="ctr"/>
-            <a:r>
-              <a:rPr lang="en-US" sz="1400" dirty="0" smtClean="0"/>
-              <a:t>Term Token</a:t>
-            </a:r>
-            <a:endParaRPr lang="en-US" sz="1400" dirty="0"/>
-          </a:p>
-        </p:txBody>
-      </p:sp>
-      <p:cxnSp>
-        <p:nvCxnSpPr>
-          <p:cNvPr id="50" name="Elbow Connector 49"/>
-          <p:cNvCxnSpPr>
-            <a:stCxn id="13" idx="3"/>
-            <a:endCxn id="48" idx="1"/>
-          </p:cNvCxnSpPr>
-          <p:nvPr/>
-        </p:nvCxnSpPr>
-        <p:spPr>
-          <a:xfrm flipV="1">
-            <a:off x="6953379" y="2207172"/>
-            <a:ext cx="247123" cy="1"/>
-          </a:xfrm>
-          <a:prstGeom prst="bentConnector3">
-            <a:avLst/>
-          </a:prstGeom>
-          <a:ln>
-            <a:tailEnd type="triangle"/>
-          </a:ln>
-        </p:spPr>
-        <p:style>
-          <a:lnRef idx="1">
-            <a:schemeClr val="accent1"/>
-          </a:lnRef>
-          <a:fillRef idx="0">
-            <a:schemeClr val="accent1"/>
-          </a:fillRef>
-          <a:effectRef idx="0">
-            <a:schemeClr val="accent1"/>
-          </a:effectRef>
-          <a:fontRef idx="minor">
-            <a:schemeClr val="tx1"/>
-          </a:fontRef>
-        </p:style>
-      </p:cxnSp>
-      <p:sp>
-        <p:nvSpPr>
-          <p:cNvPr id="52" name="Rectangle 51"/>
-          <p:cNvSpPr/>
-          <p:nvPr/>
-        </p:nvSpPr>
-        <p:spPr>
-          <a:xfrm>
-            <a:off x="5772541" y="2591851"/>
-            <a:ext cx="1037372" cy="132430"/>
+            <a:off x="413056" y="2585545"/>
+            <a:ext cx="750439" cy="132430"/>
           </a:xfrm>
           <a:prstGeom prst="rect">
             <a:avLst/>
@@ -3813,8 +4317,8 @@
           <a:p>
             <a:pPr algn="ctr"/>
             <a:r>
-              <a:rPr lang="en-US" sz="800" smtClean="0"/>
-              <a:t>Rule based merging</a:t>
+              <a:rPr lang="en-US" sz="800" dirty="0" err="1" smtClean="0"/>
+              <a:t>MaxEnt</a:t>
             </a:r>
             <a:endParaRPr lang="en-US" sz="800" dirty="0"/>
           </a:p>
@@ -3822,57 +4326,13 @@
       </p:sp>
       <p:sp>
         <p:nvSpPr>
-          <p:cNvPr id="53" name="Rectangle 52"/>
+          <p:cNvPr id="66" name="Rectangle 65"/>
           <p:cNvSpPr/>
           <p:nvPr/>
         </p:nvSpPr>
         <p:spPr>
           <a:xfrm>
-            <a:off x="2159876" y="2585545"/>
-            <a:ext cx="881026" cy="132430"/>
-          </a:xfrm>
-          <a:prstGeom prst="rect">
-            <a:avLst/>
-          </a:prstGeom>
-        </p:spPr>
-        <p:style>
-          <a:lnRef idx="2">
-            <a:schemeClr val="accent6">
-              <a:shade val="50000"/>
-            </a:schemeClr>
-          </a:lnRef>
-          <a:fillRef idx="1">
-            <a:schemeClr val="accent6"/>
-          </a:fillRef>
-          <a:effectRef idx="0">
-            <a:schemeClr val="accent6"/>
-          </a:effectRef>
-          <a:fontRef idx="minor">
-            <a:schemeClr val="lt1"/>
-          </a:fontRef>
-        </p:style>
-        <p:txBody>
-          <a:bodyPr rtlCol="0" anchor="ctr"/>
-          <a:lstStyle/>
-          <a:p>
-            <a:pPr algn="ctr"/>
-            <a:r>
-              <a:rPr lang="en-US" sz="800" smtClean="0"/>
-              <a:t>Regex splitting</a:t>
-            </a:r>
-            <a:endParaRPr lang="en-US" sz="800" dirty="0"/>
-          </a:p>
-        </p:txBody>
-      </p:sp>
-      <p:sp>
-        <p:nvSpPr>
-          <p:cNvPr id="59" name="Rectangle 58"/>
-          <p:cNvSpPr/>
-          <p:nvPr/>
-        </p:nvSpPr>
-        <p:spPr>
-          <a:xfrm>
-            <a:off x="126125" y="1910781"/>
+            <a:off x="9213101" y="813500"/>
             <a:ext cx="1324303" cy="592784"/>
           </a:xfrm>
           <a:prstGeom prst="rect">
@@ -3901,177 +4361,13 @@
           <a:p>
             <a:pPr algn="ctr"/>
             <a:r>
-              <a:rPr lang="en-US" sz="1600" dirty="0" smtClean="0"/>
-              <a:t>Sentence Detector</a:t>
-            </a:r>
-            <a:endParaRPr lang="en-US" sz="1600" dirty="0"/>
-          </a:p>
-        </p:txBody>
-      </p:sp>
-      <p:sp>
-        <p:nvSpPr>
-          <p:cNvPr id="60" name="Rounded Rectangle 59"/>
-          <p:cNvSpPr/>
-          <p:nvPr/>
-        </p:nvSpPr>
-        <p:spPr>
-          <a:xfrm>
-            <a:off x="1097280" y="3285534"/>
-            <a:ext cx="1103586" cy="592783"/>
-          </a:xfrm>
-          <a:prstGeom prst="roundRect">
-            <a:avLst/>
-          </a:prstGeom>
-        </p:spPr>
-        <p:style>
-          <a:lnRef idx="2">
-            <a:schemeClr val="accent1">
-              <a:shade val="50000"/>
-            </a:schemeClr>
-          </a:lnRef>
-          <a:fillRef idx="1">
-            <a:schemeClr val="accent1"/>
-          </a:fillRef>
-          <a:effectRef idx="0">
-            <a:schemeClr val="accent1"/>
-          </a:effectRef>
-          <a:fontRef idx="minor">
-            <a:schemeClr val="lt1"/>
-          </a:fontRef>
-        </p:style>
-        <p:txBody>
-          <a:bodyPr rtlCol="0" anchor="ctr"/>
-          <a:lstStyle/>
-          <a:p>
-            <a:pPr algn="ctr"/>
-            <a:r>
-              <a:rPr lang="en-US" sz="1400" dirty="0" smtClean="0"/>
-              <a:t>Sentence</a:t>
-            </a:r>
-            <a:endParaRPr lang="en-US" sz="1400" dirty="0"/>
-          </a:p>
-        </p:txBody>
-      </p:sp>
-      <p:cxnSp>
-        <p:nvCxnSpPr>
-          <p:cNvPr id="61" name="Elbow Connector 60"/>
-          <p:cNvCxnSpPr>
-            <a:stCxn id="61" idx="3"/>
-          </p:cNvCxnSpPr>
-          <p:nvPr/>
-        </p:nvCxnSpPr>
-        <p:spPr>
-          <a:xfrm>
-            <a:off x="1450428" y="2207173"/>
-            <a:ext cx="198645" cy="1078361"/>
-          </a:xfrm>
-          <a:prstGeom prst="bentConnector2">
-            <a:avLst/>
-          </a:prstGeom>
-          <a:ln>
-            <a:tailEnd type="triangle"/>
-          </a:ln>
-        </p:spPr>
-        <p:style>
-          <a:lnRef idx="1">
-            <a:schemeClr val="accent1"/>
-          </a:lnRef>
-          <a:fillRef idx="0">
-            <a:schemeClr val="accent1"/>
-          </a:fillRef>
-          <a:effectRef idx="0">
-            <a:schemeClr val="accent1"/>
-          </a:effectRef>
-          <a:fontRef idx="minor">
-            <a:schemeClr val="tx1"/>
-          </a:fontRef>
-        </p:style>
-      </p:cxnSp>
-      <p:sp>
-        <p:nvSpPr>
-          <p:cNvPr id="63" name="Rectangle 62"/>
-          <p:cNvSpPr/>
-          <p:nvPr/>
-        </p:nvSpPr>
-        <p:spPr>
-          <a:xfrm>
-            <a:off x="413056" y="2585545"/>
-            <a:ext cx="750439" cy="132430"/>
-          </a:xfrm>
-          <a:prstGeom prst="rect">
-            <a:avLst/>
-          </a:prstGeom>
-        </p:spPr>
-        <p:style>
-          <a:lnRef idx="2">
-            <a:schemeClr val="accent6">
-              <a:shade val="50000"/>
-            </a:schemeClr>
-          </a:lnRef>
-          <a:fillRef idx="1">
-            <a:schemeClr val="accent6"/>
-          </a:fillRef>
-          <a:effectRef idx="0">
-            <a:schemeClr val="accent6"/>
-          </a:effectRef>
-          <a:fontRef idx="minor">
-            <a:schemeClr val="lt1"/>
-          </a:fontRef>
-        </p:style>
-        <p:txBody>
-          <a:bodyPr rtlCol="0" anchor="ctr"/>
-          <a:lstStyle/>
-          <a:p>
-            <a:pPr algn="ctr"/>
-            <a:r>
-              <a:rPr lang="en-US" sz="800" dirty="0" err="1" smtClean="0"/>
-              <a:t>MaxEnt</a:t>
-            </a:r>
-            <a:endParaRPr lang="en-US" sz="800" dirty="0"/>
-          </a:p>
-        </p:txBody>
-      </p:sp>
-      <p:sp>
-        <p:nvSpPr>
-          <p:cNvPr id="66" name="Rectangle 65"/>
-          <p:cNvSpPr/>
-          <p:nvPr/>
-        </p:nvSpPr>
-        <p:spPr>
-          <a:xfrm>
-            <a:off x="7950940" y="832421"/>
-            <a:ext cx="1324303" cy="592784"/>
-          </a:xfrm>
-          <a:prstGeom prst="rect">
-            <a:avLst/>
-          </a:prstGeom>
-        </p:spPr>
-        <p:style>
-          <a:lnRef idx="2">
-            <a:schemeClr val="accent4">
-              <a:shade val="50000"/>
-            </a:schemeClr>
-          </a:lnRef>
-          <a:fillRef idx="1">
-            <a:schemeClr val="accent4"/>
-          </a:fillRef>
-          <a:effectRef idx="0">
-            <a:schemeClr val="accent4"/>
-          </a:effectRef>
-          <a:fontRef idx="minor">
-            <a:schemeClr val="lt1"/>
-          </a:fontRef>
-        </p:style>
-        <p:txBody>
-          <a:bodyPr rtlCol="0" anchor="ctr"/>
-          <a:lstStyle/>
-          <a:p>
-            <a:pPr algn="ctr"/>
-            <a:r>
               <a:rPr lang="en-US" dirty="0" smtClean="0"/>
-              <a:t>Acronym Detector</a:t>
-            </a:r>
-            <a:endParaRPr lang="en-US" dirty="0"/>
+              <a:t>Acronym </a:t>
+            </a:r>
+            <a:r>
+              <a:rPr lang="en-US" dirty="0" smtClean="0"/>
+              <a:t>Processor</a:t>
+            </a:r>
           </a:p>
         </p:txBody>
       </p:sp>
@@ -4086,8 +4382,8 @@
         </p:nvCxnSpPr>
         <p:spPr>
           <a:xfrm rot="5400000" flipH="1" flipV="1">
-            <a:off x="7460634" y="1420475"/>
-            <a:ext cx="781967" cy="198645"/>
+            <a:off x="8698719" y="1386939"/>
+            <a:ext cx="791428" cy="237335"/>
           </a:xfrm>
           <a:prstGeom prst="bentConnector2">
             <a:avLst/>
@@ -4119,7 +4415,7 @@
         </p:nvSpPr>
         <p:spPr>
           <a:xfrm>
-            <a:off x="8940612" y="1910780"/>
+            <a:off x="10164083" y="1901320"/>
             <a:ext cx="1103586" cy="592783"/>
           </a:xfrm>
           <a:prstGeom prst="roundRect">
@@ -4165,87 +4461,8 @@
         </p:nvCxnSpPr>
         <p:spPr>
           <a:xfrm>
-            <a:off x="9275243" y="1128813"/>
+            <a:off x="10537404" y="1109892"/>
             <a:ext cx="173427" cy="791426"/>
-          </a:xfrm>
-          <a:prstGeom prst="bentConnector2">
-            <a:avLst/>
-          </a:prstGeom>
-          <a:ln>
-            <a:tailEnd type="triangle"/>
-          </a:ln>
-        </p:spPr>
-        <p:style>
-          <a:lnRef idx="1">
-            <a:schemeClr val="accent1"/>
-          </a:lnRef>
-          <a:fillRef idx="0">
-            <a:schemeClr val="accent1"/>
-          </a:fillRef>
-          <a:effectRef idx="0">
-            <a:schemeClr val="accent1"/>
-          </a:effectRef>
-          <a:fontRef idx="minor">
-            <a:schemeClr val="tx1"/>
-          </a:fontRef>
-        </p:style>
-      </p:cxnSp>
-      <p:sp>
-        <p:nvSpPr>
-          <p:cNvPr id="73" name="Rectangle 72"/>
-          <p:cNvSpPr/>
-          <p:nvPr/>
-        </p:nvSpPr>
-        <p:spPr>
-          <a:xfrm>
-            <a:off x="9783301" y="832421"/>
-            <a:ext cx="1324303" cy="592784"/>
-          </a:xfrm>
-          <a:prstGeom prst="rect">
-            <a:avLst/>
-          </a:prstGeom>
-        </p:spPr>
-        <p:style>
-          <a:lnRef idx="2">
-            <a:schemeClr val="accent4">
-              <a:shade val="50000"/>
-            </a:schemeClr>
-          </a:lnRef>
-          <a:fillRef idx="1">
-            <a:schemeClr val="accent4"/>
-          </a:fillRef>
-          <a:effectRef idx="0">
-            <a:schemeClr val="accent4"/>
-          </a:effectRef>
-          <a:fontRef idx="minor">
-            <a:schemeClr val="lt1"/>
-          </a:fontRef>
-        </p:style>
-        <p:txBody>
-          <a:bodyPr rtlCol="0" anchor="ctr"/>
-          <a:lstStyle/>
-          <a:p>
-            <a:pPr algn="ctr"/>
-            <a:r>
-              <a:rPr lang="en-US" dirty="0" smtClean="0"/>
-              <a:t>Acronym Expander</a:t>
-            </a:r>
-            <a:endParaRPr lang="en-US" dirty="0"/>
-          </a:p>
-        </p:txBody>
-      </p:sp>
-      <p:cxnSp>
-        <p:nvCxnSpPr>
-          <p:cNvPr id="78" name="Elbow Connector 77"/>
-          <p:cNvCxnSpPr>
-            <a:endCxn id="73" idx="1"/>
-          </p:cNvCxnSpPr>
-          <p:nvPr/>
-        </p:nvCxnSpPr>
-        <p:spPr>
-          <a:xfrm rot="5400000" flipH="1" flipV="1">
-            <a:off x="9317033" y="1444513"/>
-            <a:ext cx="781967" cy="150569"/>
           </a:xfrm>
           <a:prstGeom prst="bentConnector2">
             <a:avLst/>
@@ -4283,170 +4500,6 @@
             <a:ext cx="1078357" cy="170268"/>
           </a:xfrm>
           <a:prstGeom prst="bentConnector2">
-            <a:avLst/>
-          </a:prstGeom>
-          <a:ln>
-            <a:tailEnd type="triangle"/>
-          </a:ln>
-        </p:spPr>
-        <p:style>
-          <a:lnRef idx="1">
-            <a:schemeClr val="accent1"/>
-          </a:lnRef>
-          <a:fillRef idx="0">
-            <a:schemeClr val="accent1"/>
-          </a:fillRef>
-          <a:effectRef idx="0">
-            <a:schemeClr val="accent1"/>
-          </a:effectRef>
-          <a:fontRef idx="minor">
-            <a:schemeClr val="tx1"/>
-          </a:fontRef>
-        </p:style>
-      </p:cxnSp>
-      <p:sp>
-        <p:nvSpPr>
-          <p:cNvPr id="264" name="Rounded Rectangle 263"/>
-          <p:cNvSpPr/>
-          <p:nvPr/>
-        </p:nvSpPr>
-        <p:spPr>
-          <a:xfrm>
-            <a:off x="10785185" y="1910780"/>
-            <a:ext cx="1103586" cy="592783"/>
-          </a:xfrm>
-          <a:prstGeom prst="roundRect">
-            <a:avLst/>
-          </a:prstGeom>
-        </p:spPr>
-        <p:style>
-          <a:lnRef idx="2">
-            <a:schemeClr val="accent1">
-              <a:shade val="50000"/>
-            </a:schemeClr>
-          </a:lnRef>
-          <a:fillRef idx="1">
-            <a:schemeClr val="accent1"/>
-          </a:fillRef>
-          <a:effectRef idx="0">
-            <a:schemeClr val="accent1"/>
-          </a:effectRef>
-          <a:fontRef idx="minor">
-            <a:schemeClr val="lt1"/>
-          </a:fontRef>
-        </p:style>
-        <p:txBody>
-          <a:bodyPr rtlCol="0" anchor="ctr"/>
-          <a:lstStyle/>
-          <a:p>
-            <a:pPr algn="ctr"/>
-            <a:r>
-              <a:rPr lang="en-US" sz="1400" dirty="0" smtClean="0"/>
-              <a:t>Acronym</a:t>
-            </a:r>
-          </a:p>
-          <a:p>
-            <a:pPr algn="ctr"/>
-            <a:r>
-              <a:rPr lang="en-US" sz="1400" dirty="0" smtClean="0"/>
-              <a:t>Expansion</a:t>
-            </a:r>
-            <a:endParaRPr lang="en-US" sz="1400" dirty="0"/>
-          </a:p>
-        </p:txBody>
-      </p:sp>
-      <p:cxnSp>
-        <p:nvCxnSpPr>
-          <p:cNvPr id="265" name="Elbow Connector 264"/>
-          <p:cNvCxnSpPr/>
-          <p:nvPr/>
-        </p:nvCxnSpPr>
-        <p:spPr>
-          <a:xfrm>
-            <a:off x="11119816" y="1128813"/>
-            <a:ext cx="173427" cy="791426"/>
-          </a:xfrm>
-          <a:prstGeom prst="bentConnector2">
-            <a:avLst/>
-          </a:prstGeom>
-          <a:ln>
-            <a:tailEnd type="triangle"/>
-          </a:ln>
-        </p:spPr>
-        <p:style>
-          <a:lnRef idx="1">
-            <a:schemeClr val="accent1"/>
-          </a:lnRef>
-          <a:fillRef idx="0">
-            <a:schemeClr val="accent1"/>
-          </a:fillRef>
-          <a:effectRef idx="0">
-            <a:schemeClr val="accent1"/>
-          </a:effectRef>
-          <a:fontRef idx="minor">
-            <a:schemeClr val="tx1"/>
-          </a:fontRef>
-        </p:style>
-      </p:cxnSp>
-      <p:sp>
-        <p:nvSpPr>
-          <p:cNvPr id="269" name="Rounded Rectangle 268"/>
-          <p:cNvSpPr/>
-          <p:nvPr/>
-        </p:nvSpPr>
-        <p:spPr>
-          <a:xfrm>
-            <a:off x="9480590" y="5051260"/>
-            <a:ext cx="1103586" cy="592783"/>
-          </a:xfrm>
-          <a:prstGeom prst="roundRect">
-            <a:avLst/>
-          </a:prstGeom>
-        </p:spPr>
-        <p:style>
-          <a:lnRef idx="2">
-            <a:schemeClr val="accent1">
-              <a:shade val="50000"/>
-            </a:schemeClr>
-          </a:lnRef>
-          <a:fillRef idx="1">
-            <a:schemeClr val="accent1"/>
-          </a:fillRef>
-          <a:effectRef idx="0">
-            <a:schemeClr val="accent1"/>
-          </a:effectRef>
-          <a:fontRef idx="minor">
-            <a:schemeClr val="lt1"/>
-          </a:fontRef>
-        </p:style>
-        <p:txBody>
-          <a:bodyPr rtlCol="0" anchor="ctr"/>
-          <a:lstStyle/>
-          <a:p>
-            <a:pPr algn="ctr"/>
-            <a:r>
-              <a:rPr lang="en-US" sz="1400" dirty="0" smtClean="0"/>
-              <a:t>Norm Form</a:t>
-            </a:r>
-            <a:endParaRPr lang="en-US" sz="1400" dirty="0"/>
-          </a:p>
-        </p:txBody>
-      </p:sp>
-      <p:cxnSp>
-        <p:nvCxnSpPr>
-          <p:cNvPr id="273" name="Elbow Connector 272"/>
-          <p:cNvCxnSpPr>
-            <a:stCxn id="31" idx="3"/>
-            <a:endCxn id="269" idx="1"/>
-          </p:cNvCxnSpPr>
-          <p:nvPr/>
-        </p:nvCxnSpPr>
-        <p:spPr>
-          <a:xfrm>
-            <a:off x="9275243" y="5347651"/>
-            <a:ext cx="205347" cy="1"/>
-          </a:xfrm>
-          <a:prstGeom prst="bentConnector3">
             <a:avLst/>
           </a:prstGeom>
           <a:ln>
@@ -4720,21 +4773,182 @@
           </a:fontRef>
         </p:style>
       </p:cxnSp>
+      <p:sp>
+        <p:nvSpPr>
+          <p:cNvPr id="46" name="Rectangle 45"/>
+          <p:cNvSpPr/>
+          <p:nvPr/>
+        </p:nvSpPr>
+        <p:spPr>
+          <a:xfrm>
+            <a:off x="7022806" y="773267"/>
+            <a:ext cx="986922" cy="876564"/>
+          </a:xfrm>
+          <a:prstGeom prst="rect">
+            <a:avLst/>
+          </a:prstGeom>
+        </p:spPr>
+        <p:style>
+          <a:lnRef idx="2">
+            <a:schemeClr val="accent2">
+              <a:shade val="50000"/>
+            </a:schemeClr>
+          </a:lnRef>
+          <a:fillRef idx="1">
+            <a:schemeClr val="accent2"/>
+          </a:fillRef>
+          <a:effectRef idx="0">
+            <a:schemeClr val="accent2"/>
+          </a:effectRef>
+          <a:fontRef idx="minor">
+            <a:schemeClr val="lt1"/>
+          </a:fontRef>
+        </p:style>
+        <p:txBody>
+          <a:bodyPr rtlCol="0" anchor="ctr"/>
+          <a:lstStyle/>
+          <a:p>
+            <a:pPr algn="ctr"/>
+            <a:r>
+              <a:rPr lang="en-US" sz="1400" dirty="0" smtClean="0"/>
+              <a:t>SPECIALIST</a:t>
+            </a:r>
+          </a:p>
+          <a:p>
+            <a:pPr algn="ctr"/>
+            <a:r>
+              <a:rPr lang="en-US" dirty="0" smtClean="0"/>
+              <a:t>LRAGR</a:t>
+            </a:r>
+          </a:p>
+        </p:txBody>
+      </p:sp>
       <p:cxnSp>
         <p:nvCxnSpPr>
-          <p:cNvPr id="298" name="Elbow Connector 297"/>
+          <p:cNvPr id="10" name="Straight Arrow Connector 9"/>
           <p:cNvCxnSpPr>
-            <a:stCxn id="42" idx="2"/>
-            <a:endCxn id="31" idx="1"/>
+            <a:stCxn id="30" idx="3"/>
+            <a:endCxn id="42" idx="1"/>
           </p:cNvCxnSpPr>
           <p:nvPr/>
         </p:nvCxnSpPr>
         <p:spPr>
-          <a:xfrm rot="16200000" flipH="1">
-            <a:off x="7434820" y="4831530"/>
-            <a:ext cx="586473" cy="445768"/>
-          </a:xfrm>
-          <a:prstGeom prst="bentConnector2">
+          <a:xfrm>
+            <a:off x="7328772" y="4148667"/>
+            <a:ext cx="303217" cy="0"/>
+          </a:xfrm>
+          <a:prstGeom prst="straightConnector1">
+            <a:avLst/>
+          </a:prstGeom>
+          <a:ln>
+            <a:tailEnd type="triangle"/>
+          </a:ln>
+        </p:spPr>
+        <p:style>
+          <a:lnRef idx="1">
+            <a:schemeClr val="accent1"/>
+          </a:lnRef>
+          <a:fillRef idx="0">
+            <a:schemeClr val="accent1"/>
+          </a:fillRef>
+          <a:effectRef idx="0">
+            <a:schemeClr val="accent1"/>
+          </a:effectRef>
+          <a:fontRef idx="minor">
+            <a:schemeClr val="tx1"/>
+          </a:fontRef>
+        </p:style>
+      </p:cxnSp>
+      <p:cxnSp>
+        <p:nvCxnSpPr>
+          <p:cNvPr id="24" name="Elbow Connector 23"/>
+          <p:cNvCxnSpPr>
+            <a:stCxn id="42" idx="3"/>
+            <a:endCxn id="13" idx="1"/>
+          </p:cNvCxnSpPr>
+          <p:nvPr/>
+        </p:nvCxnSpPr>
+        <p:spPr>
+          <a:xfrm flipH="1" flipV="1">
+            <a:off x="6852547" y="2197713"/>
+            <a:ext cx="1883028" cy="1950954"/>
+          </a:xfrm>
+          <a:prstGeom prst="bentConnector5">
+            <a:avLst>
+              <a:gd name="adj1" fmla="val -12140"/>
+              <a:gd name="adj2" fmla="val 50000"/>
+              <a:gd name="adj3" fmla="val 112140"/>
+            </a:avLst>
+          </a:prstGeom>
+          <a:ln>
+            <a:tailEnd type="triangle"/>
+          </a:ln>
+        </p:spPr>
+        <p:style>
+          <a:lnRef idx="1">
+            <a:schemeClr val="accent1"/>
+          </a:lnRef>
+          <a:fillRef idx="0">
+            <a:schemeClr val="accent1"/>
+          </a:fillRef>
+          <a:effectRef idx="0">
+            <a:schemeClr val="accent1"/>
+          </a:effectRef>
+          <a:fontRef idx="minor">
+            <a:schemeClr val="tx1"/>
+          </a:fontRef>
+        </p:style>
+      </p:cxnSp>
+      <p:cxnSp>
+        <p:nvCxnSpPr>
+          <p:cNvPr id="27" name="Elbow Connector 26"/>
+          <p:cNvCxnSpPr>
+            <a:endCxn id="13" idx="1"/>
+          </p:cNvCxnSpPr>
+          <p:nvPr/>
+        </p:nvCxnSpPr>
+        <p:spPr>
+          <a:xfrm flipV="1">
+            <a:off x="5467945" y="2197713"/>
+            <a:ext cx="1384602" cy="1087817"/>
+          </a:xfrm>
+          <a:prstGeom prst="bentConnector3">
+            <a:avLst/>
+          </a:prstGeom>
+          <a:ln>
+            <a:tailEnd type="triangle"/>
+          </a:ln>
+        </p:spPr>
+        <p:style>
+          <a:lnRef idx="1">
+            <a:schemeClr val="accent1"/>
+          </a:lnRef>
+          <a:fillRef idx="0">
+            <a:schemeClr val="accent1"/>
+          </a:fillRef>
+          <a:effectRef idx="0">
+            <a:schemeClr val="accent1"/>
+          </a:effectRef>
+          <a:fontRef idx="minor">
+            <a:schemeClr val="tx1"/>
+          </a:fontRef>
+        </p:style>
+      </p:cxnSp>
+      <p:cxnSp>
+        <p:nvCxnSpPr>
+          <p:cNvPr id="38" name="Elbow Connector 37"/>
+          <p:cNvCxnSpPr>
+            <a:stCxn id="46" idx="2"/>
+            <a:endCxn id="13" idx="0"/>
+          </p:cNvCxnSpPr>
+          <p:nvPr/>
+        </p:nvCxnSpPr>
+        <p:spPr>
+          <a:xfrm rot="5400000">
+            <a:off x="7389738" y="1774792"/>
+            <a:ext cx="251490" cy="1568"/>
+          </a:xfrm>
+          <a:prstGeom prst="bentConnector3">
             <a:avLst/>
           </a:prstGeom>
           <a:ln>
@@ -5035,4 +5249,265 @@
     </a:ext>
   </a:extLst>
 </a:theme>
+</file>
+
+<file path=ppt/theme/theme2.xml><?xml version="1.0" encoding="utf-8"?>
+<a:theme xmlns:a="http://schemas.openxmlformats.org/drawingml/2006/main" name="Office Theme">
+  <a:themeElements>
+    <a:clrScheme name="Office">
+      <a:dk1>
+        <a:sysClr val="windowText" lastClr="000000"/>
+      </a:dk1>
+      <a:lt1>
+        <a:sysClr val="window" lastClr="FFFFFF"/>
+      </a:lt1>
+      <a:dk2>
+        <a:srgbClr val="44546A"/>
+      </a:dk2>
+      <a:lt2>
+        <a:srgbClr val="E7E6E6"/>
+      </a:lt2>
+      <a:accent1>
+        <a:srgbClr val="5B9BD5"/>
+      </a:accent1>
+      <a:accent2>
+        <a:srgbClr val="ED7D31"/>
+      </a:accent2>
+      <a:accent3>
+        <a:srgbClr val="A5A5A5"/>
+      </a:accent3>
+      <a:accent4>
+        <a:srgbClr val="FFC000"/>
+      </a:accent4>
+      <a:accent5>
+        <a:srgbClr val="4472C4"/>
+      </a:accent5>
+      <a:accent6>
+        <a:srgbClr val="70AD47"/>
+      </a:accent6>
+      <a:hlink>
+        <a:srgbClr val="0563C1"/>
+      </a:hlink>
+      <a:folHlink>
+        <a:srgbClr val="954F72"/>
+      </a:folHlink>
+    </a:clrScheme>
+    <a:fontScheme name="Office">
+      <a:majorFont>
+        <a:latin typeface="Calibri Light" panose="020F0302020204030204"/>
+        <a:ea typeface=""/>
+        <a:cs typeface=""/>
+        <a:font script="Jpan" typeface="Yu Gothic Light"/>
+        <a:font script="Hang" typeface="맑은 고딕"/>
+        <a:font script="Hans" typeface="DengXian Light"/>
+        <a:font script="Hant" typeface="新細明體"/>
+        <a:font script="Arab" typeface="Times New Roman"/>
+        <a:font script="Hebr" typeface="Times New Roman"/>
+        <a:font script="Thai" typeface="Angsana New"/>
+        <a:font script="Ethi" typeface="Nyala"/>
+        <a:font script="Beng" typeface="Vrinda"/>
+        <a:font script="Gujr" typeface="Shruti"/>
+        <a:font script="Khmr" typeface="MoolBoran"/>
+        <a:font script="Knda" typeface="Tunga"/>
+        <a:font script="Guru" typeface="Raavi"/>
+        <a:font script="Cans" typeface="Euphemia"/>
+        <a:font script="Cher" typeface="Plantagenet Cherokee"/>
+        <a:font script="Yiii" typeface="Microsoft Yi Baiti"/>
+        <a:font script="Tibt" typeface="Microsoft Himalaya"/>
+        <a:font script="Thaa" typeface="MV Boli"/>
+        <a:font script="Deva" typeface="Mangal"/>
+        <a:font script="Telu" typeface="Gautami"/>
+        <a:font script="Taml" typeface="Latha"/>
+        <a:font script="Syrc" typeface="Estrangelo Edessa"/>
+        <a:font script="Orya" typeface="Kalinga"/>
+        <a:font script="Mlym" typeface="Kartika"/>
+        <a:font script="Laoo" typeface="DokChampa"/>
+        <a:font script="Sinh" typeface="Iskoola Pota"/>
+        <a:font script="Mong" typeface="Mongolian Baiti"/>
+        <a:font script="Viet" typeface="Times New Roman"/>
+        <a:font script="Uigh" typeface="Microsoft Uighur"/>
+        <a:font script="Geor" typeface="Sylfaen"/>
+      </a:majorFont>
+      <a:minorFont>
+        <a:latin typeface="Calibri" panose="020F0502020204030204"/>
+        <a:ea typeface=""/>
+        <a:cs typeface=""/>
+        <a:font script="Jpan" typeface="Yu Gothic"/>
+        <a:font script="Hang" typeface="맑은 고딕"/>
+        <a:font script="Hans" typeface="DengXian"/>
+        <a:font script="Hant" typeface="新細明體"/>
+        <a:font script="Arab" typeface="Arial"/>
+        <a:font script="Hebr" typeface="Arial"/>
+        <a:font script="Thai" typeface="Cordia New"/>
+        <a:font script="Ethi" typeface="Nyala"/>
+        <a:font script="Beng" typeface="Vrinda"/>
+        <a:font script="Gujr" typeface="Shruti"/>
+        <a:font script="Khmr" typeface="DaunPenh"/>
+        <a:font script="Knda" typeface="Tunga"/>
+        <a:font script="Guru" typeface="Raavi"/>
+        <a:font script="Cans" typeface="Euphemia"/>
+        <a:font script="Cher" typeface="Plantagenet Cherokee"/>
+        <a:font script="Yiii" typeface="Microsoft Yi Baiti"/>
+        <a:font script="Tibt" typeface="Microsoft Himalaya"/>
+        <a:font script="Thaa" typeface="MV Boli"/>
+        <a:font script="Deva" typeface="Mangal"/>
+        <a:font script="Telu" typeface="Gautami"/>
+        <a:font script="Taml" typeface="Latha"/>
+        <a:font script="Syrc" typeface="Estrangelo Edessa"/>
+        <a:font script="Orya" typeface="Kalinga"/>
+        <a:font script="Mlym" typeface="Kartika"/>
+        <a:font script="Laoo" typeface="DokChampa"/>
+        <a:font script="Sinh" typeface="Iskoola Pota"/>
+        <a:font script="Mong" typeface="Mongolian Baiti"/>
+        <a:font script="Viet" typeface="Arial"/>
+        <a:font script="Uigh" typeface="Microsoft Uighur"/>
+        <a:font script="Geor" typeface="Sylfaen"/>
+      </a:minorFont>
+    </a:fontScheme>
+    <a:fmtScheme name="Office">
+      <a:fillStyleLst>
+        <a:solidFill>
+          <a:schemeClr val="phClr"/>
+        </a:solidFill>
+        <a:gradFill rotWithShape="1">
+          <a:gsLst>
+            <a:gs pos="0">
+              <a:schemeClr val="phClr">
+                <a:lumMod val="110000"/>
+                <a:satMod val="105000"/>
+                <a:tint val="67000"/>
+              </a:schemeClr>
+            </a:gs>
+            <a:gs pos="50000">
+              <a:schemeClr val="phClr">
+                <a:lumMod val="105000"/>
+                <a:satMod val="103000"/>
+                <a:tint val="73000"/>
+              </a:schemeClr>
+            </a:gs>
+            <a:gs pos="100000">
+              <a:schemeClr val="phClr">
+                <a:lumMod val="105000"/>
+                <a:satMod val="109000"/>
+                <a:tint val="81000"/>
+              </a:schemeClr>
+            </a:gs>
+          </a:gsLst>
+          <a:lin ang="5400000" scaled="0"/>
+        </a:gradFill>
+        <a:gradFill rotWithShape="1">
+          <a:gsLst>
+            <a:gs pos="0">
+              <a:schemeClr val="phClr">
+                <a:satMod val="103000"/>
+                <a:lumMod val="102000"/>
+                <a:tint val="94000"/>
+              </a:schemeClr>
+            </a:gs>
+            <a:gs pos="50000">
+              <a:schemeClr val="phClr">
+                <a:satMod val="110000"/>
+                <a:lumMod val="100000"/>
+                <a:shade val="100000"/>
+              </a:schemeClr>
+            </a:gs>
+            <a:gs pos="100000">
+              <a:schemeClr val="phClr">
+                <a:lumMod val="99000"/>
+                <a:satMod val="120000"/>
+                <a:shade val="78000"/>
+              </a:schemeClr>
+            </a:gs>
+          </a:gsLst>
+          <a:lin ang="5400000" scaled="0"/>
+        </a:gradFill>
+      </a:fillStyleLst>
+      <a:lnStyleLst>
+        <a:ln w="6350" cap="flat" cmpd="sng" algn="ctr">
+          <a:solidFill>
+            <a:schemeClr val="phClr"/>
+          </a:solidFill>
+          <a:prstDash val="solid"/>
+          <a:miter lim="800000"/>
+        </a:ln>
+        <a:ln w="12700" cap="flat" cmpd="sng" algn="ctr">
+          <a:solidFill>
+            <a:schemeClr val="phClr"/>
+          </a:solidFill>
+          <a:prstDash val="solid"/>
+          <a:miter lim="800000"/>
+        </a:ln>
+        <a:ln w="19050" cap="flat" cmpd="sng" algn="ctr">
+          <a:solidFill>
+            <a:schemeClr val="phClr"/>
+          </a:solidFill>
+          <a:prstDash val="solid"/>
+          <a:miter lim="800000"/>
+        </a:ln>
+      </a:lnStyleLst>
+      <a:effectStyleLst>
+        <a:effectStyle>
+          <a:effectLst/>
+        </a:effectStyle>
+        <a:effectStyle>
+          <a:effectLst/>
+        </a:effectStyle>
+        <a:effectStyle>
+          <a:effectLst>
+            <a:outerShdw blurRad="57150" dist="19050" dir="5400000" algn="ctr" rotWithShape="0">
+              <a:srgbClr val="000000">
+                <a:alpha val="63000"/>
+              </a:srgbClr>
+            </a:outerShdw>
+          </a:effectLst>
+        </a:effectStyle>
+      </a:effectStyleLst>
+      <a:bgFillStyleLst>
+        <a:solidFill>
+          <a:schemeClr val="phClr"/>
+        </a:solidFill>
+        <a:solidFill>
+          <a:schemeClr val="phClr">
+            <a:tint val="95000"/>
+            <a:satMod val="170000"/>
+          </a:schemeClr>
+        </a:solidFill>
+        <a:gradFill rotWithShape="1">
+          <a:gsLst>
+            <a:gs pos="0">
+              <a:schemeClr val="phClr">
+                <a:tint val="93000"/>
+                <a:satMod val="150000"/>
+                <a:shade val="98000"/>
+                <a:lumMod val="102000"/>
+              </a:schemeClr>
+            </a:gs>
+            <a:gs pos="50000">
+              <a:schemeClr val="phClr">
+                <a:tint val="98000"/>
+                <a:satMod val="130000"/>
+                <a:shade val="90000"/>
+                <a:lumMod val="103000"/>
+              </a:schemeClr>
+            </a:gs>
+            <a:gs pos="100000">
+              <a:schemeClr val="phClr">
+                <a:shade val="63000"/>
+                <a:satMod val="120000"/>
+              </a:schemeClr>
+            </a:gs>
+          </a:gsLst>
+          <a:lin ang="5400000" scaled="0"/>
+        </a:gradFill>
+      </a:bgFillStyleLst>
+    </a:fmtScheme>
+  </a:themeElements>
+  <a:objectDefaults/>
+  <a:extraClrSchemeLst/>
+  <a:extLst>
+    <a:ext uri="{05A4C25C-085E-4340-85A3-A5531E510DB2}">
+      <thm15:themeFamily xmlns:thm15="http://schemas.microsoft.com/office/thememl/2012/main" name="Office Theme" id="{62F939B6-93AF-4DB8-9C6B-D6C7DFDC589F}" vid="{4A3C46E8-61CC-4603-A589-7422A47A8E4A}"/>
+    </a:ext>
+  </a:extLst>
+</a:theme>
 </file>
</xml_diff>